<commit_message>
Bump version to 1.1.1
</commit_message>
<xml_diff>
--- a/doc/vimania-uri.pptx
+++ b/doc/vimania-uri.pptx
@@ -2646,8 +2646,8 @@
         </p:blipFill>
         <p:spPr>
           <a:xfrm>
-            <a:off x="832756" y="986063"/>
-            <a:ext cx="5708850" cy="2287816"/>
+            <a:off x="832756" y="566112"/>
+            <a:ext cx="6756764" cy="2707767"/>
           </a:xfrm>
           <a:prstGeom prst="rect">
             <a:avLst/>
@@ -2668,7 +2668,7 @@
         </p:nvSpPr>
         <p:spPr>
           <a:xfrm>
-            <a:off x="4451034" y="1363433"/>
+            <a:off x="4451034" y="1048473"/>
             <a:ext cx="1549715" cy="204108"/>
           </a:xfrm>
           <a:prstGeom prst="wedgeRoundRectCallout">
@@ -2705,7 +2705,7 @@
               <a:t>r</a:t>
             </a:r>
             <a:r>
-              <a:rPr lang="en-DE" sz="1100"/>
+              <a:rPr lang="en-DE" sz="1100" dirty="0"/>
               <a:t>aw link (no metadata)</a:t>
             </a:r>
           </a:p>
@@ -2725,7 +2725,7 @@
         </p:nvSpPr>
         <p:spPr>
           <a:xfrm>
-            <a:off x="2032907" y="1853290"/>
+            <a:off x="2032907" y="1619610"/>
             <a:ext cx="2106386" cy="204108"/>
           </a:xfrm>
           <a:prstGeom prst="wedgeRoundRectCallout">
@@ -2782,7 +2782,7 @@
         </p:nvSpPr>
         <p:spPr>
           <a:xfrm>
-            <a:off x="4263798" y="2938689"/>
+            <a:off x="4761638" y="2938689"/>
             <a:ext cx="1832202" cy="204108"/>
           </a:xfrm>
           <a:prstGeom prst="wedgeRoundRectCallout">
@@ -2829,6 +2829,36 @@
           </a:p>
         </p:txBody>
       </p:sp>
+      <p:pic>
+        <p:nvPicPr>
+          <p:cNvPr id="16" name="Picture 15">
+            <a:extLst>
+              <a:ext uri="{FF2B5EF4-FFF2-40B4-BE49-F238E27FC236}">
+                <a16:creationId xmlns:a16="http://schemas.microsoft.com/office/drawing/2014/main" id="{F99D0BEA-D7C8-8E8E-571F-6C1B423DB339}"/>
+              </a:ext>
+            </a:extLst>
+          </p:cNvPr>
+          <p:cNvPicPr>
+            <a:picLocks noChangeAspect="1"/>
+          </p:cNvPicPr>
+          <p:nvPr/>
+        </p:nvPicPr>
+        <p:blipFill>
+          <a:blip r:embed="rId3"/>
+          <a:stretch>
+            <a:fillRect/>
+          </a:stretch>
+        </p:blipFill>
+        <p:spPr>
+          <a:xfrm>
+            <a:off x="832756" y="3575221"/>
+            <a:ext cx="6756400" cy="2705100"/>
+          </a:xfrm>
+          <a:prstGeom prst="rect">
+            <a:avLst/>
+          </a:prstGeom>
+        </p:spPr>
+      </p:pic>
     </p:spTree>
     <p:extLst>
       <p:ext uri="{BB962C8B-B14F-4D97-AF65-F5344CB8AC3E}">

</xml_diff>